<commit_message>
m to s in schema image
</commit_message>
<xml_diff>
--- a/Presentations/EMR Interroperability V0.1.pptx
+++ b/Presentations/EMR Interroperability V0.1.pptx
@@ -33507,7 +33507,7 @@
                   <a:schemeClr val="tx1"/>
                 </a:solidFill>
               </a:rPr>
-              <a:t>m</a:t>
+              <a:t>s</a:t>
             </a:r>
             <a:r>
               <a:rPr lang="en-US" sz="1200" baseline="-25000" dirty="0" smtClean="0">
@@ -33584,7 +33584,7 @@
                   <a:schemeClr val="tx1"/>
                 </a:solidFill>
               </a:rPr>
-              <a:t>m</a:t>
+              <a:t>s</a:t>
             </a:r>
             <a:r>
               <a:rPr lang="en-US" sz="1200" baseline="-25000" dirty="0" smtClean="0">
@@ -33661,7 +33661,7 @@
                   <a:schemeClr val="tx1"/>
                 </a:solidFill>
               </a:rPr>
-              <a:t>m</a:t>
+              <a:t>s</a:t>
             </a:r>
             <a:r>
               <a:rPr lang="en-US" sz="1200" baseline="-25000" dirty="0" smtClean="0">
@@ -33738,7 +33738,7 @@
                   <a:schemeClr val="tx1"/>
                 </a:solidFill>
               </a:rPr>
-              <a:t>m</a:t>
+              <a:t>s</a:t>
             </a:r>
             <a:r>
               <a:rPr lang="en-US" sz="1200" baseline="-25000" dirty="0" smtClean="0">
@@ -33815,7 +33815,7 @@
                   <a:schemeClr val="tx1"/>
                 </a:solidFill>
               </a:rPr>
-              <a:t>m</a:t>
+              <a:t>s</a:t>
             </a:r>
             <a:r>
               <a:rPr lang="en-US" sz="1200" baseline="-25000" dirty="0" smtClean="0">

</xml_diff>

<commit_message>
attibute respresenation image added
</commit_message>
<xml_diff>
--- a/Presentations/EMR Interroperability V0.1.pptx
+++ b/Presentations/EMR Interroperability V0.1.pptx
@@ -5,7 +5,7 @@
     <p:sldMasterId id="2147483648" r:id="rId1"/>
   </p:sldMasterIdLst>
   <p:notesMasterIdLst>
-    <p:notesMasterId r:id="rId13"/>
+    <p:notesMasterId r:id="rId14"/>
   </p:notesMasterIdLst>
   <p:sldIdLst>
     <p:sldId id="261" r:id="rId2"/>
@@ -18,7 +18,8 @@
     <p:sldId id="272" r:id="rId9"/>
     <p:sldId id="273" r:id="rId10"/>
     <p:sldId id="274" r:id="rId11"/>
-    <p:sldId id="260" r:id="rId12"/>
+    <p:sldId id="275" r:id="rId12"/>
+    <p:sldId id="260" r:id="rId13"/>
   </p:sldIdLst>
   <p:sldSz cx="12192000" cy="6858000"/>
   <p:notesSz cx="6797675" cy="9929813"/>
@@ -207,7 +208,7 @@
           <a:p>
             <a:fld id="{0CE678D8-32C5-404E-AC33-A2CB57AB8A03}" type="datetimeFigureOut">
               <a:rPr lang="en-US" smtClean="0"/>
-              <a:t>1/12/2021</a:t>
+              <a:t>1/16/2021</a:t>
             </a:fld>
             <a:endParaRPr lang="en-US"/>
           </a:p>
@@ -811,6 +812,90 @@
 </p:notes>
 </file>
 
+<file path=ppt/notesSlides/notesSlide5.xml><?xml version="1.0" encoding="utf-8"?>
+<p:notes xmlns:a="http://schemas.openxmlformats.org/drawingml/2006/main" xmlns:r="http://schemas.openxmlformats.org/officeDocument/2006/relationships" xmlns:p="http://schemas.openxmlformats.org/presentationml/2006/main">
+  <p:cSld>
+    <p:spTree>
+      <p:nvGrpSpPr>
+        <p:cNvPr id="1" name=""/>
+        <p:cNvGrpSpPr/>
+        <p:nvPr/>
+      </p:nvGrpSpPr>
+      <p:grpSpPr>
+        <a:xfrm>
+          <a:off x="0" y="0"/>
+          <a:ext cx="0" cy="0"/>
+          <a:chOff x="0" y="0"/>
+          <a:chExt cx="0" cy="0"/>
+        </a:xfrm>
+      </p:grpSpPr>
+      <p:sp>
+        <p:nvSpPr>
+          <p:cNvPr id="2" name="Slide Image Placeholder 1"/>
+          <p:cNvSpPr>
+            <a:spLocks noGrp="1" noRot="1" noChangeAspect="1"/>
+          </p:cNvSpPr>
+          <p:nvPr>
+            <p:ph type="sldImg"/>
+          </p:nvPr>
+        </p:nvSpPr>
+        <p:spPr/>
+      </p:sp>
+      <p:sp>
+        <p:nvSpPr>
+          <p:cNvPr id="3" name="Notes Placeholder 2"/>
+          <p:cNvSpPr>
+            <a:spLocks noGrp="1"/>
+          </p:cNvSpPr>
+          <p:nvPr>
+            <p:ph type="body" idx="1"/>
+          </p:nvPr>
+        </p:nvSpPr>
+        <p:spPr/>
+        <p:txBody>
+          <a:bodyPr/>
+          <a:lstStyle/>
+          <a:p>
+            <a:endParaRPr lang="en-US"/>
+          </a:p>
+        </p:txBody>
+      </p:sp>
+      <p:sp>
+        <p:nvSpPr>
+          <p:cNvPr id="4" name="Slide Number Placeholder 3"/>
+          <p:cNvSpPr>
+            <a:spLocks noGrp="1"/>
+          </p:cNvSpPr>
+          <p:nvPr>
+            <p:ph type="sldNum" sz="quarter" idx="10"/>
+          </p:nvPr>
+        </p:nvSpPr>
+        <p:spPr/>
+        <p:txBody>
+          <a:bodyPr/>
+          <a:lstStyle/>
+          <a:p>
+            <a:fld id="{1B1EBEA6-BF93-4335-B192-3BF2ACD8F71F}" type="slidenum">
+              <a:rPr lang="en-US" smtClean="0"/>
+              <a:t>11</a:t>
+            </a:fld>
+            <a:endParaRPr lang="en-US"/>
+          </a:p>
+        </p:txBody>
+      </p:sp>
+    </p:spTree>
+    <p:extLst>
+      <p:ext uri="{BB962C8B-B14F-4D97-AF65-F5344CB8AC3E}">
+        <p14:creationId xmlns:p14="http://schemas.microsoft.com/office/powerpoint/2010/main" val="3067309106"/>
+      </p:ext>
+    </p:extLst>
+  </p:cSld>
+  <p:clrMapOvr>
+    <a:masterClrMapping/>
+  </p:clrMapOvr>
+</p:notes>
+</file>
+
 <file path=ppt/slideLayouts/slideLayout1.xml><?xml version="1.0" encoding="utf-8"?>
 <p:sldLayout xmlns:a="http://schemas.openxmlformats.org/drawingml/2006/main" xmlns:r="http://schemas.openxmlformats.org/officeDocument/2006/relationships" xmlns:p="http://schemas.openxmlformats.org/presentationml/2006/main" type="title" preserve="1">
   <p:cSld name="Title Slide">
@@ -942,7 +1027,7 @@
           <a:p>
             <a:fld id="{C390AA1A-B384-4FFF-A591-3630D6086717}" type="datetimeFigureOut">
               <a:rPr lang="en-US" smtClean="0"/>
-              <a:t>1/12/2021</a:t>
+              <a:t>1/16/2021</a:t>
             </a:fld>
             <a:endParaRPr lang="en-US"/>
           </a:p>
@@ -1112,7 +1197,7 @@
           <a:p>
             <a:fld id="{C390AA1A-B384-4FFF-A591-3630D6086717}" type="datetimeFigureOut">
               <a:rPr lang="en-US" smtClean="0"/>
-              <a:t>1/12/2021</a:t>
+              <a:t>1/16/2021</a:t>
             </a:fld>
             <a:endParaRPr lang="en-US"/>
           </a:p>
@@ -1292,7 +1377,7 @@
           <a:p>
             <a:fld id="{C390AA1A-B384-4FFF-A591-3630D6086717}" type="datetimeFigureOut">
               <a:rPr lang="en-US" smtClean="0"/>
-              <a:t>1/12/2021</a:t>
+              <a:t>1/16/2021</a:t>
             </a:fld>
             <a:endParaRPr lang="en-US"/>
           </a:p>
@@ -1462,7 +1547,7 @@
           <a:p>
             <a:fld id="{C390AA1A-B384-4FFF-A591-3630D6086717}" type="datetimeFigureOut">
               <a:rPr lang="en-US" smtClean="0"/>
-              <a:t>1/12/2021</a:t>
+              <a:t>1/16/2021</a:t>
             </a:fld>
             <a:endParaRPr lang="en-US"/>
           </a:p>
@@ -1708,7 +1793,7 @@
           <a:p>
             <a:fld id="{C390AA1A-B384-4FFF-A591-3630D6086717}" type="datetimeFigureOut">
               <a:rPr lang="en-US" smtClean="0"/>
-              <a:t>1/12/2021</a:t>
+              <a:t>1/16/2021</a:t>
             </a:fld>
             <a:endParaRPr lang="en-US"/>
           </a:p>
@@ -1940,7 +2025,7 @@
           <a:p>
             <a:fld id="{C390AA1A-B384-4FFF-A591-3630D6086717}" type="datetimeFigureOut">
               <a:rPr lang="en-US" smtClean="0"/>
-              <a:t>1/12/2021</a:t>
+              <a:t>1/16/2021</a:t>
             </a:fld>
             <a:endParaRPr lang="en-US"/>
           </a:p>
@@ -2307,7 +2392,7 @@
           <a:p>
             <a:fld id="{C390AA1A-B384-4FFF-A591-3630D6086717}" type="datetimeFigureOut">
               <a:rPr lang="en-US" smtClean="0"/>
-              <a:t>1/12/2021</a:t>
+              <a:t>1/16/2021</a:t>
             </a:fld>
             <a:endParaRPr lang="en-US"/>
           </a:p>
@@ -2425,7 +2510,7 @@
           <a:p>
             <a:fld id="{C390AA1A-B384-4FFF-A591-3630D6086717}" type="datetimeFigureOut">
               <a:rPr lang="en-US" smtClean="0"/>
-              <a:t>1/12/2021</a:t>
+              <a:t>1/16/2021</a:t>
             </a:fld>
             <a:endParaRPr lang="en-US"/>
           </a:p>
@@ -2520,7 +2605,7 @@
           <a:p>
             <a:fld id="{C390AA1A-B384-4FFF-A591-3630D6086717}" type="datetimeFigureOut">
               <a:rPr lang="en-US" smtClean="0"/>
-              <a:t>1/12/2021</a:t>
+              <a:t>1/16/2021</a:t>
             </a:fld>
             <a:endParaRPr lang="en-US"/>
           </a:p>
@@ -2797,7 +2882,7 @@
           <a:p>
             <a:fld id="{C390AA1A-B384-4FFF-A591-3630D6086717}" type="datetimeFigureOut">
               <a:rPr lang="en-US" smtClean="0"/>
-              <a:t>1/12/2021</a:t>
+              <a:t>1/16/2021</a:t>
             </a:fld>
             <a:endParaRPr lang="en-US"/>
           </a:p>
@@ -3050,7 +3135,7 @@
           <a:p>
             <a:fld id="{C390AA1A-B384-4FFF-A591-3630D6086717}" type="datetimeFigureOut">
               <a:rPr lang="en-US" smtClean="0"/>
-              <a:t>1/12/2021</a:t>
+              <a:t>1/16/2021</a:t>
             </a:fld>
             <a:endParaRPr lang="en-US"/>
           </a:p>
@@ -3263,7 +3348,7 @@
           <a:p>
             <a:fld id="{C390AA1A-B384-4FFF-A591-3630D6086717}" type="datetimeFigureOut">
               <a:rPr lang="en-US" smtClean="0"/>
-              <a:t>1/12/2021</a:t>
+              <a:t>1/16/2021</a:t>
             </a:fld>
             <a:endParaRPr lang="en-US"/>
           </a:p>
@@ -14903,6 +14988,663 @@
 </file>
 
 <file path=ppt/slides/slide11.xml><?xml version="1.0" encoding="utf-8"?>
+<p:sld xmlns:a="http://schemas.openxmlformats.org/drawingml/2006/main" xmlns:r="http://schemas.openxmlformats.org/officeDocument/2006/relationships" xmlns:p="http://schemas.openxmlformats.org/presentationml/2006/main">
+  <p:cSld>
+    <p:spTree>
+      <p:nvGrpSpPr>
+        <p:cNvPr id="1" name=""/>
+        <p:cNvGrpSpPr/>
+        <p:nvPr/>
+      </p:nvGrpSpPr>
+      <p:grpSpPr>
+        <a:xfrm>
+          <a:off x="0" y="0"/>
+          <a:ext cx="0" cy="0"/>
+          <a:chOff x="0" y="0"/>
+          <a:chExt cx="0" cy="0"/>
+        </a:xfrm>
+      </p:grpSpPr>
+      <p:graphicFrame>
+        <p:nvGraphicFramePr>
+          <p:cNvPr id="6" name="Table 5"/>
+          <p:cNvGraphicFramePr>
+            <a:graphicFrameLocks noGrp="1"/>
+          </p:cNvGraphicFramePr>
+          <p:nvPr>
+            <p:extLst>
+              <p:ext uri="{D42A27DB-BD31-4B8C-83A1-F6EECF244321}">
+                <p14:modId xmlns:p14="http://schemas.microsoft.com/office/powerpoint/2010/main" val="2624893102"/>
+              </p:ext>
+            </p:extLst>
+          </p:nvPr>
+        </p:nvGraphicFramePr>
+        <p:xfrm>
+          <a:off x="2324218" y="1826443"/>
+          <a:ext cx="7555071" cy="1009086"/>
+        </p:xfrm>
+        <a:graphic>
+          <a:graphicData uri="http://schemas.openxmlformats.org/drawingml/2006/table">
+            <a:tbl>
+              <a:tblPr firstRow="1" bandRow="1"/>
+              <a:tblGrid>
+                <a:gridCol w="2518357">
+                  <a:extLst>
+                    <a:ext uri="{9D8B030D-6E8A-4147-A177-3AD203B41FA5}">
+                      <a16:colId xmlns:a16="http://schemas.microsoft.com/office/drawing/2014/main" val="1316458371"/>
+                    </a:ext>
+                  </a:extLst>
+                </a:gridCol>
+                <a:gridCol w="2518357">
+                  <a:extLst>
+                    <a:ext uri="{9D8B030D-6E8A-4147-A177-3AD203B41FA5}">
+                      <a16:colId xmlns:a16="http://schemas.microsoft.com/office/drawing/2014/main" val="4225085063"/>
+                    </a:ext>
+                  </a:extLst>
+                </a:gridCol>
+                <a:gridCol w="2518357">
+                  <a:extLst>
+                    <a:ext uri="{9D8B030D-6E8A-4147-A177-3AD203B41FA5}">
+                      <a16:colId xmlns:a16="http://schemas.microsoft.com/office/drawing/2014/main" val="1820702016"/>
+                    </a:ext>
+                  </a:extLst>
+                </a:gridCol>
+              </a:tblGrid>
+              <a:tr h="336362">
+                <a:tc gridSpan="3">
+                  <a:txBody>
+                    <a:bodyPr/>
+                    <a:lstStyle/>
+                    <a:p>
+                      <a:pPr algn="ctr"/>
+                      <a:r>
+                        <a:rPr lang="en-US" sz="1200" b="1" dirty="0" smtClean="0"/>
+                        <a:t>Attribute</a:t>
+                      </a:r>
+                      <a:r>
+                        <a:rPr lang="en-US" sz="1200" b="1" baseline="0" dirty="0" smtClean="0"/>
+                        <a:t> Context</a:t>
+                      </a:r>
+                      <a:endParaRPr lang="en-US" sz="1200" b="1" dirty="0"/>
+                    </a:p>
+                  </a:txBody>
+                  <a:tcPr/>
+                </a:tc>
+                <a:tc hMerge="1">
+                  <a:txBody>
+                    <a:bodyPr/>
+                    <a:lstStyle/>
+                    <a:p>
+                      <a:endParaRPr lang="en-US" sz="1200" dirty="0"/>
+                    </a:p>
+                  </a:txBody>
+                  <a:tcPr/>
+                </a:tc>
+                <a:tc hMerge="1">
+                  <a:txBody>
+                    <a:bodyPr/>
+                    <a:lstStyle/>
+                    <a:p>
+                      <a:pPr marL="0" marR="0" lvl="0" indent="0" algn="ctr" defTabSz="914400" rtl="0" eaLnBrk="1" fontAlgn="auto" latinLnBrk="0" hangingPunct="1">
+                        <a:lnSpc>
+                          <a:spcPct val="100000"/>
+                        </a:lnSpc>
+                        <a:spcBef>
+                          <a:spcPts val="0"/>
+                        </a:spcBef>
+                        <a:spcAft>
+                          <a:spcPts val="0"/>
+                        </a:spcAft>
+                        <a:buClrTx/>
+                        <a:buSzTx/>
+                        <a:buFontTx/>
+                        <a:buNone/>
+                        <a:tabLst/>
+                        <a:defRPr/>
+                      </a:pPr>
+                      <a:endParaRPr lang="en-US" sz="1200" b="1" dirty="0"/>
+                    </a:p>
+                  </a:txBody>
+                  <a:tcPr/>
+                </a:tc>
+                <a:extLst>
+                  <a:ext uri="{0D108BD9-81ED-4DB2-BD59-A6C34878D82A}">
+                    <a16:rowId xmlns:a16="http://schemas.microsoft.com/office/drawing/2014/main" val="181864080"/>
+                  </a:ext>
+                </a:extLst>
+              </a:tr>
+              <a:tr h="336362">
+                <a:tc>
+                  <a:txBody>
+                    <a:bodyPr/>
+                    <a:lstStyle/>
+                    <a:p>
+                      <a:r>
+                        <a:rPr lang="en-US" sz="1200" dirty="0" smtClean="0">
+                          <a:solidFill>
+                            <a:schemeClr val="tx1"/>
+                          </a:solidFill>
+                        </a:rPr>
+                        <a:t>Schema Name</a:t>
+                      </a:r>
+                      <a:endParaRPr lang="en-US" sz="1200" dirty="0">
+                        <a:solidFill>
+                          <a:schemeClr val="tx1"/>
+                        </a:solidFill>
+                      </a:endParaRPr>
+                    </a:p>
+                  </a:txBody>
+                  <a:tcPr/>
+                </a:tc>
+                <a:tc>
+                  <a:txBody>
+                    <a:bodyPr/>
+                    <a:lstStyle/>
+                    <a:p>
+                      <a:r>
+                        <a:rPr lang="en-US" sz="1200" dirty="0" smtClean="0">
+                          <a:solidFill>
+                            <a:schemeClr val="tx1"/>
+                          </a:solidFill>
+                        </a:rPr>
+                        <a:t>Table</a:t>
+                      </a:r>
+                      <a:r>
+                        <a:rPr lang="en-US" sz="1200" baseline="0" dirty="0" smtClean="0">
+                          <a:solidFill>
+                            <a:schemeClr val="tx1"/>
+                          </a:solidFill>
+                        </a:rPr>
+                        <a:t> Name</a:t>
+                      </a:r>
+                      <a:endParaRPr lang="en-US" sz="1200" dirty="0">
+                        <a:solidFill>
+                          <a:schemeClr val="tx1"/>
+                        </a:solidFill>
+                      </a:endParaRPr>
+                    </a:p>
+                  </a:txBody>
+                  <a:tcPr/>
+                </a:tc>
+                <a:tc>
+                  <a:txBody>
+                    <a:bodyPr/>
+                    <a:lstStyle/>
+                    <a:p>
+                      <a:pPr marL="0" marR="0" lvl="0" indent="0" algn="l" defTabSz="914400" rtl="0" eaLnBrk="1" fontAlgn="auto" latinLnBrk="0" hangingPunct="1">
+                        <a:lnSpc>
+                          <a:spcPct val="100000"/>
+                        </a:lnSpc>
+                        <a:spcBef>
+                          <a:spcPts val="0"/>
+                        </a:spcBef>
+                        <a:spcAft>
+                          <a:spcPts val="0"/>
+                        </a:spcAft>
+                        <a:buClrTx/>
+                        <a:buSzTx/>
+                        <a:buFontTx/>
+                        <a:buNone/>
+                        <a:tabLst/>
+                        <a:defRPr/>
+                      </a:pPr>
+                      <a:r>
+                        <a:rPr lang="en-US" sz="1200" dirty="0" smtClean="0">
+                          <a:solidFill>
+                            <a:schemeClr val="tx1"/>
+                          </a:solidFill>
+                        </a:rPr>
+                        <a:t>Attribute</a:t>
+                      </a:r>
+                      <a:r>
+                        <a:rPr lang="en-US" sz="1200" baseline="0" dirty="0" smtClean="0">
+                          <a:solidFill>
+                            <a:schemeClr val="tx1"/>
+                          </a:solidFill>
+                        </a:rPr>
+                        <a:t> Name</a:t>
+                      </a:r>
+                      <a:endParaRPr lang="en-US" sz="1200" dirty="0">
+                        <a:solidFill>
+                          <a:schemeClr val="tx1"/>
+                        </a:solidFill>
+                      </a:endParaRPr>
+                    </a:p>
+                  </a:txBody>
+                  <a:tcPr/>
+                </a:tc>
+                <a:extLst>
+                  <a:ext uri="{0D108BD9-81ED-4DB2-BD59-A6C34878D82A}">
+                    <a16:rowId xmlns:a16="http://schemas.microsoft.com/office/drawing/2014/main" val="991575750"/>
+                  </a:ext>
+                </a:extLst>
+              </a:tr>
+              <a:tr h="336362">
+                <a:tc>
+                  <a:txBody>
+                    <a:bodyPr/>
+                    <a:lstStyle/>
+                    <a:p>
+                      <a:pPr marL="0" marR="0" lvl="0" indent="0" algn="l" defTabSz="914400" rtl="0" eaLnBrk="1" fontAlgn="auto" latinLnBrk="0" hangingPunct="1">
+                        <a:lnSpc>
+                          <a:spcPct val="100000"/>
+                        </a:lnSpc>
+                        <a:spcBef>
+                          <a:spcPts val="0"/>
+                        </a:spcBef>
+                        <a:spcAft>
+                          <a:spcPts val="0"/>
+                        </a:spcAft>
+                        <a:buClrTx/>
+                        <a:buSzTx/>
+                        <a:buFontTx/>
+                        <a:buNone/>
+                        <a:tabLst/>
+                        <a:defRPr/>
+                      </a:pPr>
+                      <a:r>
+                        <a:rPr lang="en-US" sz="1200" dirty="0" smtClean="0">
+                          <a:solidFill>
+                            <a:schemeClr val="tx1"/>
+                          </a:solidFill>
+                        </a:rPr>
+                        <a:t>Schema</a:t>
+                      </a:r>
+                      <a:r>
+                        <a:rPr lang="en-US" sz="1200" baseline="0" dirty="0" smtClean="0">
+                          <a:solidFill>
+                            <a:schemeClr val="tx1"/>
+                          </a:solidFill>
+                        </a:rPr>
+                        <a:t> Version</a:t>
+                      </a:r>
+                      <a:endParaRPr lang="en-US" sz="1200" dirty="0">
+                        <a:solidFill>
+                          <a:schemeClr val="tx1"/>
+                        </a:solidFill>
+                      </a:endParaRPr>
+                    </a:p>
+                  </a:txBody>
+                  <a:tcPr/>
+                </a:tc>
+                <a:tc>
+                  <a:txBody>
+                    <a:bodyPr/>
+                    <a:lstStyle/>
+                    <a:p>
+                      <a:r>
+                        <a:rPr lang="en-US" sz="1200" dirty="0" smtClean="0">
+                          <a:solidFill>
+                            <a:schemeClr val="tx1"/>
+                          </a:solidFill>
+                        </a:rPr>
+                        <a:t>Source</a:t>
+                      </a:r>
+                      <a:endParaRPr lang="en-US" sz="1200" dirty="0">
+                        <a:solidFill>
+                          <a:schemeClr val="tx1"/>
+                        </a:solidFill>
+                      </a:endParaRPr>
+                    </a:p>
+                  </a:txBody>
+                  <a:tcPr/>
+                </a:tc>
+                <a:tc>
+                  <a:txBody>
+                    <a:bodyPr/>
+                    <a:lstStyle/>
+                    <a:p>
+                      <a:pPr marL="0" marR="0" lvl="0" indent="0" algn="l" defTabSz="914400" rtl="0" eaLnBrk="1" fontAlgn="auto" latinLnBrk="0" hangingPunct="1">
+                        <a:lnSpc>
+                          <a:spcPct val="100000"/>
+                        </a:lnSpc>
+                        <a:spcBef>
+                          <a:spcPts val="0"/>
+                        </a:spcBef>
+                        <a:spcAft>
+                          <a:spcPts val="0"/>
+                        </a:spcAft>
+                        <a:buClrTx/>
+                        <a:buSzTx/>
+                        <a:buFontTx/>
+                        <a:buNone/>
+                        <a:tabLst/>
+                        <a:defRPr/>
+                      </a:pPr>
+                      <a:r>
+                        <a:rPr lang="en-US" sz="1200" dirty="0" smtClean="0">
+                          <a:solidFill>
+                            <a:schemeClr val="tx1"/>
+                          </a:solidFill>
+                        </a:rPr>
+                        <a:t>Recorded Date</a:t>
+                      </a:r>
+                      <a:endParaRPr lang="en-US" sz="1200" dirty="0">
+                        <a:solidFill>
+                          <a:schemeClr val="tx1"/>
+                        </a:solidFill>
+                      </a:endParaRPr>
+                    </a:p>
+                  </a:txBody>
+                  <a:tcPr/>
+                </a:tc>
+                <a:extLst>
+                  <a:ext uri="{0D108BD9-81ED-4DB2-BD59-A6C34878D82A}">
+                    <a16:rowId xmlns:a16="http://schemas.microsoft.com/office/drawing/2014/main" val="404934628"/>
+                  </a:ext>
+                </a:extLst>
+              </a:tr>
+            </a:tbl>
+          </a:graphicData>
+        </a:graphic>
+      </p:graphicFrame>
+      <p:graphicFrame>
+        <p:nvGraphicFramePr>
+          <p:cNvPr id="7" name="Table 6"/>
+          <p:cNvGraphicFramePr>
+            <a:graphicFrameLocks noGrp="1"/>
+          </p:cNvGraphicFramePr>
+          <p:nvPr>
+            <p:extLst>
+              <p:ext uri="{D42A27DB-BD31-4B8C-83A1-F6EECF244321}">
+                <p14:modId xmlns:p14="http://schemas.microsoft.com/office/powerpoint/2010/main" val="669268903"/>
+              </p:ext>
+            </p:extLst>
+          </p:nvPr>
+        </p:nvGraphicFramePr>
+        <p:xfrm>
+          <a:off x="2324217" y="3067076"/>
+          <a:ext cx="7555072" cy="672724"/>
+        </p:xfrm>
+        <a:graphic>
+          <a:graphicData uri="http://schemas.openxmlformats.org/drawingml/2006/table">
+            <a:tbl>
+              <a:tblPr firstRow="1" bandRow="1"/>
+              <a:tblGrid>
+                <a:gridCol w="3777536">
+                  <a:extLst>
+                    <a:ext uri="{9D8B030D-6E8A-4147-A177-3AD203B41FA5}">
+                      <a16:colId xmlns:a16="http://schemas.microsoft.com/office/drawing/2014/main" val="1316458371"/>
+                    </a:ext>
+                  </a:extLst>
+                </a:gridCol>
+                <a:gridCol w="3777536">
+                  <a:extLst>
+                    <a:ext uri="{9D8B030D-6E8A-4147-A177-3AD203B41FA5}">
+                      <a16:colId xmlns:a16="http://schemas.microsoft.com/office/drawing/2014/main" val="4225085063"/>
+                    </a:ext>
+                  </a:extLst>
+                </a:gridCol>
+              </a:tblGrid>
+              <a:tr h="336362">
+                <a:tc gridSpan="2">
+                  <a:txBody>
+                    <a:bodyPr/>
+                    <a:lstStyle/>
+                    <a:p>
+                      <a:pPr algn="ctr"/>
+                      <a:r>
+                        <a:rPr lang="en-US" sz="1200" b="1" dirty="0" smtClean="0"/>
+                        <a:t>Attribute Type</a:t>
+                      </a:r>
+                      <a:endParaRPr lang="en-US" sz="1200" b="1" dirty="0"/>
+                    </a:p>
+                  </a:txBody>
+                  <a:tcPr/>
+                </a:tc>
+                <a:tc hMerge="1">
+                  <a:txBody>
+                    <a:bodyPr/>
+                    <a:lstStyle/>
+                    <a:p>
+                      <a:endParaRPr lang="en-US" sz="1200" dirty="0"/>
+                    </a:p>
+                  </a:txBody>
+                  <a:tcPr/>
+                </a:tc>
+                <a:extLst>
+                  <a:ext uri="{0D108BD9-81ED-4DB2-BD59-A6C34878D82A}">
+                    <a16:rowId xmlns:a16="http://schemas.microsoft.com/office/drawing/2014/main" val="1973666550"/>
+                  </a:ext>
+                </a:extLst>
+              </a:tr>
+              <a:tr h="336362">
+                <a:tc>
+                  <a:txBody>
+                    <a:bodyPr/>
+                    <a:lstStyle/>
+                    <a:p>
+                      <a:r>
+                        <a:rPr lang="en-US" sz="1200" dirty="0" smtClean="0"/>
+                        <a:t>Attribute</a:t>
+                      </a:r>
+                      <a:r>
+                        <a:rPr lang="en-US" sz="1200" baseline="0" dirty="0" smtClean="0"/>
+                        <a:t> Type</a:t>
+                      </a:r>
+                      <a:endParaRPr lang="en-US" sz="1200" dirty="0"/>
+                    </a:p>
+                  </a:txBody>
+                  <a:tcPr/>
+                </a:tc>
+                <a:tc>
+                  <a:txBody>
+                    <a:bodyPr/>
+                    <a:lstStyle/>
+                    <a:p>
+                      <a:r>
+                        <a:rPr lang="en-US" sz="1200" dirty="0" smtClean="0"/>
+                        <a:t>Possible</a:t>
+                      </a:r>
+                      <a:r>
+                        <a:rPr lang="en-US" sz="1200" baseline="0" dirty="0" smtClean="0"/>
+                        <a:t> Value</a:t>
+                      </a:r>
+                      <a:endParaRPr lang="en-US" sz="1200" dirty="0"/>
+                    </a:p>
+                  </a:txBody>
+                  <a:tcPr/>
+                </a:tc>
+                <a:extLst>
+                  <a:ext uri="{0D108BD9-81ED-4DB2-BD59-A6C34878D82A}">
+                    <a16:rowId xmlns:a16="http://schemas.microsoft.com/office/drawing/2014/main" val="991575750"/>
+                  </a:ext>
+                </a:extLst>
+              </a:tr>
+            </a:tbl>
+          </a:graphicData>
+        </a:graphic>
+      </p:graphicFrame>
+      <p:graphicFrame>
+        <p:nvGraphicFramePr>
+          <p:cNvPr id="8" name="Table 7"/>
+          <p:cNvGraphicFramePr>
+            <a:graphicFrameLocks noGrp="1"/>
+          </p:cNvGraphicFramePr>
+          <p:nvPr>
+            <p:extLst>
+              <p:ext uri="{D42A27DB-BD31-4B8C-83A1-F6EECF244321}">
+                <p14:modId xmlns:p14="http://schemas.microsoft.com/office/powerpoint/2010/main" val="3696341049"/>
+              </p:ext>
+            </p:extLst>
+          </p:nvPr>
+        </p:nvGraphicFramePr>
+        <p:xfrm>
+          <a:off x="2324218" y="3971347"/>
+          <a:ext cx="7555071" cy="672724"/>
+        </p:xfrm>
+        <a:graphic>
+          <a:graphicData uri="http://schemas.openxmlformats.org/drawingml/2006/table">
+            <a:tbl>
+              <a:tblPr firstRow="1" bandRow="1"/>
+              <a:tblGrid>
+                <a:gridCol w="2518357">
+                  <a:extLst>
+                    <a:ext uri="{9D8B030D-6E8A-4147-A177-3AD203B41FA5}">
+                      <a16:colId xmlns:a16="http://schemas.microsoft.com/office/drawing/2014/main" val="1316458371"/>
+                    </a:ext>
+                  </a:extLst>
+                </a:gridCol>
+                <a:gridCol w="2518357">
+                  <a:extLst>
+                    <a:ext uri="{9D8B030D-6E8A-4147-A177-3AD203B41FA5}">
+                      <a16:colId xmlns:a16="http://schemas.microsoft.com/office/drawing/2014/main" val="4225085063"/>
+                    </a:ext>
+                  </a:extLst>
+                </a:gridCol>
+                <a:gridCol w="2518357">
+                  <a:extLst>
+                    <a:ext uri="{9D8B030D-6E8A-4147-A177-3AD203B41FA5}">
+                      <a16:colId xmlns:a16="http://schemas.microsoft.com/office/drawing/2014/main" val="1082934323"/>
+                    </a:ext>
+                  </a:extLst>
+                </a:gridCol>
+              </a:tblGrid>
+              <a:tr h="336362">
+                <a:tc gridSpan="3">
+                  <a:txBody>
+                    <a:bodyPr/>
+                    <a:lstStyle/>
+                    <a:p>
+                      <a:pPr algn="ctr"/>
+                      <a:r>
+                        <a:rPr lang="en-US" sz="1200" b="1" dirty="0" smtClean="0"/>
+                        <a:t>Attribute Semantics</a:t>
+                      </a:r>
+                      <a:endParaRPr lang="en-US" sz="1200" b="1" dirty="0"/>
+                    </a:p>
+                  </a:txBody>
+                  <a:tcPr/>
+                </a:tc>
+                <a:tc hMerge="1">
+                  <a:txBody>
+                    <a:bodyPr/>
+                    <a:lstStyle/>
+                    <a:p>
+                      <a:endParaRPr lang="en-US" sz="1200" dirty="0"/>
+                    </a:p>
+                  </a:txBody>
+                  <a:tcPr/>
+                </a:tc>
+                <a:tc hMerge="1">
+                  <a:txBody>
+                    <a:bodyPr/>
+                    <a:lstStyle/>
+                    <a:p>
+                      <a:pPr algn="ctr"/>
+                      <a:endParaRPr lang="en-US" sz="1200" b="1" dirty="0"/>
+                    </a:p>
+                  </a:txBody>
+                  <a:tcPr/>
+                </a:tc>
+                <a:extLst>
+                  <a:ext uri="{0D108BD9-81ED-4DB2-BD59-A6C34878D82A}">
+                    <a16:rowId xmlns:a16="http://schemas.microsoft.com/office/drawing/2014/main" val="1973666550"/>
+                  </a:ext>
+                </a:extLst>
+              </a:tr>
+              <a:tr h="336362">
+                <a:tc>
+                  <a:txBody>
+                    <a:bodyPr/>
+                    <a:lstStyle/>
+                    <a:p>
+                      <a:r>
+                        <a:rPr lang="en-US" sz="1200" dirty="0" smtClean="0"/>
+                        <a:t>Suffix</a:t>
+                      </a:r>
+                      <a:r>
+                        <a:rPr lang="en-US" sz="1200" baseline="0" dirty="0" smtClean="0"/>
+                        <a:t> Tree</a:t>
+                      </a:r>
+                      <a:endParaRPr lang="en-US" sz="1200" dirty="0"/>
+                    </a:p>
+                  </a:txBody>
+                  <a:tcPr/>
+                </a:tc>
+                <a:tc>
+                  <a:txBody>
+                    <a:bodyPr/>
+                    <a:lstStyle/>
+                    <a:p>
+                      <a:r>
+                        <a:rPr lang="en-US" sz="1200" dirty="0" smtClean="0"/>
+                        <a:t>Suffix Concept</a:t>
+                      </a:r>
+                      <a:r>
+                        <a:rPr lang="en-US" sz="1200" baseline="0" dirty="0" smtClean="0"/>
+                        <a:t> </a:t>
+                      </a:r>
+                      <a:r>
+                        <a:rPr lang="en-US" sz="1200" dirty="0" smtClean="0"/>
+                        <a:t>Tree</a:t>
+                      </a:r>
+                      <a:endParaRPr lang="en-US" sz="1200" dirty="0"/>
+                    </a:p>
+                  </a:txBody>
+                  <a:tcPr/>
+                </a:tc>
+                <a:tc>
+                  <a:txBody>
+                    <a:bodyPr/>
+                    <a:lstStyle/>
+                    <a:p>
+                      <a:pPr marL="0" marR="0" lvl="0" indent="0" algn="l" defTabSz="914400" rtl="0" eaLnBrk="1" fontAlgn="auto" latinLnBrk="0" hangingPunct="1">
+                        <a:lnSpc>
+                          <a:spcPct val="100000"/>
+                        </a:lnSpc>
+                        <a:spcBef>
+                          <a:spcPts val="0"/>
+                        </a:spcBef>
+                        <a:spcAft>
+                          <a:spcPts val="0"/>
+                        </a:spcAft>
+                        <a:buClrTx/>
+                        <a:buSzTx/>
+                        <a:buFontTx/>
+                        <a:buNone/>
+                        <a:tabLst/>
+                        <a:defRPr/>
+                      </a:pPr>
+                      <a:r>
+                        <a:rPr lang="en-US" sz="1200" baseline="0" dirty="0" smtClean="0"/>
+                        <a:t>Tree Embedding</a:t>
+                      </a:r>
+                      <a:endParaRPr lang="en-US" sz="1200" dirty="0"/>
+                    </a:p>
+                  </a:txBody>
+                  <a:tcPr/>
+                </a:tc>
+                <a:extLst>
+                  <a:ext uri="{0D108BD9-81ED-4DB2-BD59-A6C34878D82A}">
+                    <a16:rowId xmlns:a16="http://schemas.microsoft.com/office/drawing/2014/main" val="991575750"/>
+                  </a:ext>
+                </a:extLst>
+              </a:tr>
+            </a:tbl>
+          </a:graphicData>
+        </a:graphic>
+      </p:graphicFrame>
+    </p:spTree>
+    <p:extLst>
+      <p:ext uri="{BB962C8B-B14F-4D97-AF65-F5344CB8AC3E}">
+        <p14:creationId xmlns:p14="http://schemas.microsoft.com/office/powerpoint/2010/main" val="2425517466"/>
+      </p:ext>
+    </p:extLst>
+  </p:cSld>
+  <p:clrMapOvr>
+    <a:masterClrMapping/>
+  </p:clrMapOvr>
+  <p:timing>
+    <p:tnLst>
+      <p:par>
+        <p:cTn id="1" dur="indefinite" restart="never" nodeType="tmRoot"/>
+      </p:par>
+    </p:tnLst>
+  </p:timing>
+</p:sld>
+</file>
+
+<file path=ppt/slides/slide12.xml><?xml version="1.0" encoding="utf-8"?>
 <p:sld xmlns:a="http://schemas.openxmlformats.org/drawingml/2006/main" xmlns:r="http://schemas.openxmlformats.org/officeDocument/2006/relationships" xmlns:p="http://schemas.openxmlformats.org/presentationml/2006/main">
   <p:cSld>
     <p:spTree>

</xml_diff>

<commit_message>
change attribute Rpresenation diagrame
</commit_message>
<xml_diff>
--- a/Presentations/EMR Interroperability V0.1.pptx
+++ b/Presentations/EMR Interroperability V0.1.pptx
@@ -208,7 +208,7 @@
           <a:p>
             <a:fld id="{0CE678D8-32C5-404E-AC33-A2CB57AB8A03}" type="datetimeFigureOut">
               <a:rPr lang="en-US" smtClean="0"/>
-              <a:t>1/16/2021</a:t>
+              <a:t>1/18/2021</a:t>
             </a:fld>
             <a:endParaRPr lang="en-US"/>
           </a:p>
@@ -1027,7 +1027,7 @@
           <a:p>
             <a:fld id="{C390AA1A-B384-4FFF-A591-3630D6086717}" type="datetimeFigureOut">
               <a:rPr lang="en-US" smtClean="0"/>
-              <a:t>1/16/2021</a:t>
+              <a:t>1/18/2021</a:t>
             </a:fld>
             <a:endParaRPr lang="en-US"/>
           </a:p>
@@ -1197,7 +1197,7 @@
           <a:p>
             <a:fld id="{C390AA1A-B384-4FFF-A591-3630D6086717}" type="datetimeFigureOut">
               <a:rPr lang="en-US" smtClean="0"/>
-              <a:t>1/16/2021</a:t>
+              <a:t>1/18/2021</a:t>
             </a:fld>
             <a:endParaRPr lang="en-US"/>
           </a:p>
@@ -1377,7 +1377,7 @@
           <a:p>
             <a:fld id="{C390AA1A-B384-4FFF-A591-3630D6086717}" type="datetimeFigureOut">
               <a:rPr lang="en-US" smtClean="0"/>
-              <a:t>1/16/2021</a:t>
+              <a:t>1/18/2021</a:t>
             </a:fld>
             <a:endParaRPr lang="en-US"/>
           </a:p>
@@ -1547,7 +1547,7 @@
           <a:p>
             <a:fld id="{C390AA1A-B384-4FFF-A591-3630D6086717}" type="datetimeFigureOut">
               <a:rPr lang="en-US" smtClean="0"/>
-              <a:t>1/16/2021</a:t>
+              <a:t>1/18/2021</a:t>
             </a:fld>
             <a:endParaRPr lang="en-US"/>
           </a:p>
@@ -1793,7 +1793,7 @@
           <a:p>
             <a:fld id="{C390AA1A-B384-4FFF-A591-3630D6086717}" type="datetimeFigureOut">
               <a:rPr lang="en-US" smtClean="0"/>
-              <a:t>1/16/2021</a:t>
+              <a:t>1/18/2021</a:t>
             </a:fld>
             <a:endParaRPr lang="en-US"/>
           </a:p>
@@ -2025,7 +2025,7 @@
           <a:p>
             <a:fld id="{C390AA1A-B384-4FFF-A591-3630D6086717}" type="datetimeFigureOut">
               <a:rPr lang="en-US" smtClean="0"/>
-              <a:t>1/16/2021</a:t>
+              <a:t>1/18/2021</a:t>
             </a:fld>
             <a:endParaRPr lang="en-US"/>
           </a:p>
@@ -2392,7 +2392,7 @@
           <a:p>
             <a:fld id="{C390AA1A-B384-4FFF-A591-3630D6086717}" type="datetimeFigureOut">
               <a:rPr lang="en-US" smtClean="0"/>
-              <a:t>1/16/2021</a:t>
+              <a:t>1/18/2021</a:t>
             </a:fld>
             <a:endParaRPr lang="en-US"/>
           </a:p>
@@ -2510,7 +2510,7 @@
           <a:p>
             <a:fld id="{C390AA1A-B384-4FFF-A591-3630D6086717}" type="datetimeFigureOut">
               <a:rPr lang="en-US" smtClean="0"/>
-              <a:t>1/16/2021</a:t>
+              <a:t>1/18/2021</a:t>
             </a:fld>
             <a:endParaRPr lang="en-US"/>
           </a:p>
@@ -2605,7 +2605,7 @@
           <a:p>
             <a:fld id="{C390AA1A-B384-4FFF-A591-3630D6086717}" type="datetimeFigureOut">
               <a:rPr lang="en-US" smtClean="0"/>
-              <a:t>1/16/2021</a:t>
+              <a:t>1/18/2021</a:t>
             </a:fld>
             <a:endParaRPr lang="en-US"/>
           </a:p>
@@ -2882,7 +2882,7 @@
           <a:p>
             <a:fld id="{C390AA1A-B384-4FFF-A591-3630D6086717}" type="datetimeFigureOut">
               <a:rPr lang="en-US" smtClean="0"/>
-              <a:t>1/16/2021</a:t>
+              <a:t>1/18/2021</a:t>
             </a:fld>
             <a:endParaRPr lang="en-US"/>
           </a:p>
@@ -3135,7 +3135,7 @@
           <a:p>
             <a:fld id="{C390AA1A-B384-4FFF-A591-3630D6086717}" type="datetimeFigureOut">
               <a:rPr lang="en-US" smtClean="0"/>
-              <a:t>1/16/2021</a:t>
+              <a:t>1/18/2021</a:t>
             </a:fld>
             <a:endParaRPr lang="en-US"/>
           </a:p>
@@ -3348,7 +3348,7 @@
           <a:p>
             <a:fld id="{C390AA1A-B384-4FFF-A591-3630D6086717}" type="datetimeFigureOut">
               <a:rPr lang="en-US" smtClean="0"/>
-              <a:t>1/16/2021</a:t>
+              <a:t>1/18/2021</a:t>
             </a:fld>
             <a:endParaRPr lang="en-US"/>
           </a:p>
@@ -15346,7 +15346,7 @@
           <p:nvPr>
             <p:extLst>
               <p:ext uri="{D42A27DB-BD31-4B8C-83A1-F6EECF244321}">
-                <p14:modId xmlns:p14="http://schemas.microsoft.com/office/powerpoint/2010/main" val="669268903"/>
+                <p14:modId xmlns:p14="http://schemas.microsoft.com/office/powerpoint/2010/main" val="305432290"/>
               </p:ext>
             </p:extLst>
           </p:nvPr>
@@ -15415,11 +15415,15 @@
                     <a:p>
                       <a:r>
                         <a:rPr lang="en-US" sz="1200" dirty="0" smtClean="0"/>
-                        <a:t>Attribute</a:t>
+                        <a:t>Data</a:t>
                       </a:r>
                       <a:r>
                         <a:rPr lang="en-US" sz="1200" baseline="0" dirty="0" smtClean="0"/>
-                        <a:t> Type</a:t>
+                        <a:t> </a:t>
+                      </a:r>
+                      <a:r>
+                        <a:rPr lang="en-US" sz="1200" baseline="0" dirty="0" smtClean="0"/>
+                        <a:t>Type</a:t>
                       </a:r>
                       <a:endParaRPr lang="en-US" sz="1200" dirty="0"/>
                     </a:p>

</xml_diff>